<commit_message>
Add work with history info into git-intro presentation
</commit_message>
<xml_diff>
--- a/lessons/sem_00/lesson_01/git_intro.pptx
+++ b/lessons/sem_00/lesson_01/git_intro.pptx
@@ -28,8 +28,9 @@
     <p:sldId id="344" r:id="rId21"/>
     <p:sldId id="383" r:id="rId22"/>
     <p:sldId id="384" r:id="rId23"/>
-    <p:sldId id="342" r:id="rId24"/>
-    <p:sldId id="331" r:id="rId25"/>
+    <p:sldId id="391" r:id="rId24"/>
+    <p:sldId id="342" r:id="rId25"/>
+    <p:sldId id="331" r:id="rId26"/>
   </p:sldIdLst>
   <p:sldSz cx="24742775" cy="13716000"/>
   <p:notesSz cx="6858000" cy="9144000"/>
@@ -260,6 +261,7 @@
             <p14:sldId id="344"/>
             <p14:sldId id="383"/>
             <p14:sldId id="384"/>
+            <p14:sldId id="391"/>
             <p14:sldId id="342"/>
             <p14:sldId id="331"/>
           </p14:sldIdLst>
@@ -16992,7 +16994,7 @@
           <a:p>
             <a:r>
               <a:rPr lang="ru-RU" altLang="ru-RU" dirty="0"/>
-              <a:t>Удаленные репозитории</a:t>
+              <a:t>Назад в прошлое</a:t>
             </a:r>
             <a:endParaRPr lang="ru-RU" altLang="ru-RU" dirty="0"/>
           </a:p>
@@ -17056,7 +17058,7 @@
                 <a:latin typeface="Arial Black" panose="020B0A04020102020204" pitchFamily="34" charset="0"/>
                 <a:cs typeface="Arial Black" panose="020B0A04020102020204" pitchFamily="34" charset="0"/>
               </a:rPr>
-              <a:t>Просмотр удаленных репозиториев: </a:t>
+              <a:t>Просмотр истории изменений: </a:t>
             </a:r>
             <a:endParaRPr lang="ru-RU" altLang="en-US" sz="4800">
               <a:solidFill>
@@ -17083,19 +17085,41 @@
                 <a:cs typeface="Consolas" panose="020B0609020204030204" charset="0"/>
                 <a:sym typeface="+mn-ea"/>
               </a:rPr>
-              <a:t>$ git remote</a:t>
-            </a:r>
-            <a:r>
-              <a:rPr lang="ru-RU" altLang="en-US" sz="4800">
-                <a:solidFill>
-                  <a:schemeClr val="tx1"/>
-                </a:solidFill>
-                <a:latin typeface="Arial Black" panose="020B0A04020102020204" pitchFamily="34" charset="0"/>
-                <a:cs typeface="Arial Black" panose="020B0A04020102020204" pitchFamily="34" charset="0"/>
-                <a:sym typeface="+mn-ea"/>
-              </a:rPr>
-              <a:t> - </a:t>
-            </a:r>
+              <a:t>$ git log</a:t>
+            </a:r>
+            <a:endParaRPr lang="ru-RU" altLang="en-US" sz="4800" b="1">
+              <a:solidFill>
+                <a:schemeClr val="tx1"/>
+              </a:solidFill>
+              <a:latin typeface="Consolas" panose="020B0609020204030204" charset="0"/>
+              <a:cs typeface="Consolas" panose="020B0609020204030204" charset="0"/>
+              <a:sym typeface="+mn-ea"/>
+            </a:endParaRPr>
+          </a:p>
+          <a:p>
+            <a:pPr marL="457200" lvl="1" indent="0">
+              <a:lnSpc>
+                <a:spcPct val="100000"/>
+              </a:lnSpc>
+              <a:buFont typeface="Arial" panose="020B0604020202020204" pitchFamily="34" charset="0"/>
+            </a:pPr>
+            <a:endParaRPr lang="ru-RU" altLang="en-US" sz="4800" b="1">
+              <a:solidFill>
+                <a:schemeClr val="tx1"/>
+              </a:solidFill>
+              <a:latin typeface="Consolas" panose="020B0609020204030204" charset="0"/>
+              <a:cs typeface="Consolas" panose="020B0609020204030204" charset="0"/>
+              <a:sym typeface="+mn-ea"/>
+            </a:endParaRPr>
+          </a:p>
+          <a:p>
+            <a:pPr marL="685800" lvl="0" indent="-685800">
+              <a:lnSpc>
+                <a:spcPct val="100000"/>
+              </a:lnSpc>
+              <a:buFont typeface="Arial" panose="020B0604020202020204" pitchFamily="34" charset="0"/>
+              <a:buChar char="•"/>
+            </a:pPr>
             <a:r>
               <a:rPr lang="ru-RU" altLang="en-US" sz="4800">
                 <a:solidFill>
@@ -17104,7 +17128,7 @@
                 <a:latin typeface="Arial Black" panose="020B0A04020102020204" pitchFamily="34" charset="0"/>
                 <a:cs typeface="Arial Black" panose="020B0A04020102020204" pitchFamily="34" charset="0"/>
               </a:rPr>
-              <a:t>без подробностей;</a:t>
+              <a:t>Переход к предыдущей версии:</a:t>
             </a:r>
             <a:endParaRPr lang="ru-RU" altLang="en-US" sz="4800">
               <a:solidFill>
@@ -17123,24 +17147,22 @@
               <a:buChar char="•"/>
             </a:pPr>
             <a:r>
-              <a:rPr lang="ru-RU" altLang="en-US" sz="4800" b="1">
+              <a:rPr lang="en-US" altLang="en-US" sz="4800" b="1">
                 <a:solidFill>
                   <a:schemeClr val="tx1"/>
                 </a:solidFill>
                 <a:latin typeface="Consolas" panose="020B0609020204030204" charset="0"/>
                 <a:cs typeface="Consolas" panose="020B0609020204030204" charset="0"/>
-                <a:sym typeface="+mn-ea"/>
               </a:rPr>
-              <a:t>$ git remote -v</a:t>
-            </a:r>
-            <a:r>
-              <a:rPr lang="ru-RU" altLang="en-US" sz="4800">
+              <a:t>$ git remote --soft &lt;hash&gt;</a:t>
+            </a:r>
+            <a:r>
+              <a:rPr lang="en-US" altLang="en-US" sz="4800">
                 <a:solidFill>
                   <a:schemeClr val="tx1"/>
                 </a:solidFill>
                 <a:latin typeface="Arial Black" panose="020B0A04020102020204" pitchFamily="34" charset="0"/>
                 <a:cs typeface="Arial Black" panose="020B0A04020102020204" pitchFamily="34" charset="0"/>
-                <a:sym typeface="+mn-ea"/>
               </a:rPr>
               <a:t> - </a:t>
             </a:r>
@@ -17152,7 +17174,79 @@
                 <a:latin typeface="Arial Black" panose="020B0A04020102020204" pitchFamily="34" charset="0"/>
                 <a:cs typeface="Arial Black" panose="020B0A04020102020204" pitchFamily="34" charset="0"/>
               </a:rPr>
-              <a:t>с подробностями;</a:t>
+              <a:t>откат</a:t>
+            </a:r>
+            <a:r>
+              <a:rPr lang="en-US" altLang="en-US" sz="4800">
+                <a:solidFill>
+                  <a:schemeClr val="tx1"/>
+                </a:solidFill>
+                <a:latin typeface="Arial Black" panose="020B0A04020102020204" pitchFamily="34" charset="0"/>
+                <a:cs typeface="Arial Black" panose="020B0A04020102020204" pitchFamily="34" charset="0"/>
+              </a:rPr>
+              <a:t> до указанного коммита с сохранением добавленных изменений в индексе</a:t>
+            </a:r>
+            <a:r>
+              <a:rPr lang="ru-RU" altLang="en-US" sz="4800">
+                <a:solidFill>
+                  <a:schemeClr val="tx1"/>
+                </a:solidFill>
+                <a:latin typeface="Arial Black" panose="020B0A04020102020204" pitchFamily="34" charset="0"/>
+                <a:cs typeface="Arial Black" panose="020B0A04020102020204" pitchFamily="34" charset="0"/>
+              </a:rPr>
+              <a:t>;</a:t>
+            </a:r>
+            <a:endParaRPr lang="ru-RU" altLang="en-US" sz="4800">
+              <a:solidFill>
+                <a:schemeClr val="tx1"/>
+              </a:solidFill>
+              <a:latin typeface="Arial Black" panose="020B0A04020102020204" pitchFamily="34" charset="0"/>
+              <a:cs typeface="Arial Black" panose="020B0A04020102020204" pitchFamily="34" charset="0"/>
+            </a:endParaRPr>
+          </a:p>
+          <a:p>
+            <a:pPr marL="1143000" lvl="1" indent="-685800">
+              <a:lnSpc>
+                <a:spcPct val="100000"/>
+              </a:lnSpc>
+              <a:buFont typeface="Arial" panose="020B0604020202020204" pitchFamily="34" charset="0"/>
+              <a:buChar char="•"/>
+            </a:pPr>
+            <a:endParaRPr lang="en-US" altLang="en-US" sz="4800">
+              <a:solidFill>
+                <a:schemeClr val="tx1"/>
+              </a:solidFill>
+              <a:latin typeface="Arial Black" panose="020B0A04020102020204" pitchFamily="34" charset="0"/>
+              <a:cs typeface="Arial Black" panose="020B0A04020102020204" pitchFamily="34" charset="0"/>
+            </a:endParaRPr>
+          </a:p>
+          <a:p>
+            <a:pPr marL="1143000" lvl="1" indent="-685800">
+              <a:lnSpc>
+                <a:spcPct val="100000"/>
+              </a:lnSpc>
+              <a:buFont typeface="Arial" panose="020B0604020202020204" pitchFamily="34" charset="0"/>
+              <a:buChar char="•"/>
+            </a:pPr>
+            <a:r>
+              <a:rPr lang="en-US" altLang="en-US" sz="4800" b="1">
+                <a:solidFill>
+                  <a:schemeClr val="tx1"/>
+                </a:solidFill>
+                <a:latin typeface="Consolas" panose="020B0609020204030204" charset="0"/>
+                <a:cs typeface="Consolas" panose="020B0609020204030204" charset="0"/>
+              </a:rPr>
+              <a:t>$ git remote --mixed &lt;hash&gt;</a:t>
+            </a:r>
+            <a:r>
+              <a:rPr lang="ru-RU" altLang="en-US" sz="4800">
+                <a:solidFill>
+                  <a:schemeClr val="tx1"/>
+                </a:solidFill>
+                <a:latin typeface="Arial Black" panose="020B0A04020102020204" pitchFamily="34" charset="0"/>
+                <a:cs typeface="Arial Black" panose="020B0A04020102020204" pitchFamily="34" charset="0"/>
+              </a:rPr>
+              <a:t> -  откат до указанного коммита, изменения останутся в файлах, но не будут внесены в индекс;</a:t>
             </a:r>
             <a:endParaRPr lang="ru-RU" altLang="en-US" sz="4800">
               <a:solidFill>
@@ -17179,7 +17273,7 @@
             </a:endParaRPr>
           </a:p>
           <a:p>
-            <a:pPr marL="685800" indent="-685800">
+            <a:pPr marL="1143000" lvl="1" indent="-685800">
               <a:lnSpc>
                 <a:spcPct val="100000"/>
               </a:lnSpc>
@@ -17187,34 +17281,14 @@
               <a:buChar char="•"/>
             </a:pPr>
             <a:r>
-              <a:rPr lang="ru-RU" altLang="en-US" sz="4800" b="1">
+              <a:rPr lang="en-US" altLang="en-US" sz="4800" b="1">
                 <a:solidFill>
                   <a:schemeClr val="tx1"/>
                 </a:solidFill>
                 <a:latin typeface="Consolas" panose="020B0609020204030204" charset="0"/>
                 <a:cs typeface="Consolas" panose="020B0609020204030204" charset="0"/>
               </a:rPr>
-              <a:t>$ git remote add &lt;</a:t>
-            </a:r>
-            <a:r>
-              <a:rPr lang="en-US" altLang="ru-RU" sz="4800" b="1">
-                <a:solidFill>
-                  <a:schemeClr val="tx1"/>
-                </a:solidFill>
-                <a:latin typeface="Consolas" panose="020B0609020204030204" charset="0"/>
-                <a:cs typeface="Consolas" panose="020B0609020204030204" charset="0"/>
-              </a:rPr>
-              <a:t>repo_</a:t>
-            </a:r>
-            <a:r>
-              <a:rPr lang="ru-RU" altLang="en-US" sz="4800" b="1">
-                <a:solidFill>
-                  <a:schemeClr val="tx1"/>
-                </a:solidFill>
-                <a:latin typeface="Consolas" panose="020B0609020204030204" charset="0"/>
-                <a:cs typeface="Consolas" panose="020B0609020204030204" charset="0"/>
-              </a:rPr>
-              <a:t>name&gt; &lt;url&gt;</a:t>
+              <a:t>$ git remote --hard &lt;hash&gt;</a:t>
             </a:r>
             <a:r>
               <a:rPr lang="ru-RU" altLang="en-US" sz="4800">
@@ -17224,18 +17298,7 @@
                 <a:latin typeface="Arial Black" panose="020B0A04020102020204" pitchFamily="34" charset="0"/>
                 <a:cs typeface="Arial Black" panose="020B0A04020102020204" pitchFamily="34" charset="0"/>
               </a:rPr>
-              <a:t> - д</a:t>
-            </a:r>
-            <a:r>
-              <a:rPr lang="ru-RU" altLang="en-US" sz="4800">
-                <a:solidFill>
-                  <a:schemeClr val="tx1"/>
-                </a:solidFill>
-                <a:latin typeface="Arial Black" panose="020B0A04020102020204" pitchFamily="34" charset="0"/>
-                <a:cs typeface="Arial Black" panose="020B0A04020102020204" pitchFamily="34" charset="0"/>
-                <a:sym typeface="+mn-ea"/>
-              </a:rPr>
-              <a:t>обавление репозиториев;</a:t>
+              <a:t> - откат до указанного коммита, все внесенные изменения будут утеряны;</a:t>
             </a:r>
             <a:endParaRPr lang="ru-RU" altLang="en-US" sz="4800">
               <a:solidFill>
@@ -17246,7 +17309,23 @@
             </a:endParaRPr>
           </a:p>
           <a:p>
-            <a:pPr marL="685800" indent="-685800">
+            <a:pPr marL="457200" lvl="1" indent="0">
+              <a:lnSpc>
+                <a:spcPct val="100000"/>
+              </a:lnSpc>
+              <a:buFont typeface="Arial" panose="020B0604020202020204" pitchFamily="34" charset="0"/>
+            </a:pPr>
+            <a:endParaRPr lang="ru-RU" altLang="en-US" sz="4800" b="1">
+              <a:solidFill>
+                <a:schemeClr val="tx1"/>
+              </a:solidFill>
+              <a:latin typeface="Consolas" panose="020B0609020204030204" charset="0"/>
+              <a:cs typeface="Consolas" panose="020B0609020204030204" charset="0"/>
+              <a:sym typeface="+mn-ea"/>
+            </a:endParaRPr>
+          </a:p>
+          <a:p>
+            <a:pPr marL="1143000" lvl="1" indent="-685800">
               <a:lnSpc>
                 <a:spcPct val="100000"/>
               </a:lnSpc>
@@ -17262,128 +17341,7 @@
             </a:endParaRPr>
           </a:p>
           <a:p>
-            <a:pPr marL="685800" indent="-685800">
-              <a:lnSpc>
-                <a:spcPct val="100000"/>
-              </a:lnSpc>
-              <a:buFont typeface="Arial" panose="020B0604020202020204" pitchFamily="34" charset="0"/>
-              <a:buChar char="•"/>
-            </a:pPr>
-            <a:r>
-              <a:rPr lang="ru-RU" altLang="en-US" sz="4800">
-                <a:solidFill>
-                  <a:schemeClr val="tx1"/>
-                </a:solidFill>
-                <a:latin typeface="Arial Black" panose="020B0A04020102020204" pitchFamily="34" charset="0"/>
-                <a:cs typeface="Arial Black" panose="020B0A04020102020204" pitchFamily="34" charset="0"/>
-              </a:rPr>
-              <a:t>Получение изменений:</a:t>
-            </a:r>
-            <a:endParaRPr lang="ru-RU" altLang="en-US" sz="4800">
-              <a:solidFill>
-                <a:schemeClr val="tx1"/>
-              </a:solidFill>
-              <a:latin typeface="Arial Black" panose="020B0A04020102020204" pitchFamily="34" charset="0"/>
-              <a:cs typeface="Arial Black" panose="020B0A04020102020204" pitchFamily="34" charset="0"/>
-            </a:endParaRPr>
-          </a:p>
-          <a:p>
-            <a:pPr marL="1143000" lvl="1" indent="-685800">
-              <a:lnSpc>
-                <a:spcPct val="100000"/>
-              </a:lnSpc>
-              <a:buFont typeface="Arial" panose="020B0604020202020204" pitchFamily="34" charset="0"/>
-              <a:buChar char="•"/>
-            </a:pPr>
-            <a:r>
-              <a:rPr lang="ru-RU" altLang="en-US" sz="4800" b="1">
-                <a:solidFill>
-                  <a:schemeClr val="tx1"/>
-                </a:solidFill>
-                <a:latin typeface="Consolas" panose="020B0609020204030204" charset="0"/>
-                <a:cs typeface="Consolas" panose="020B0609020204030204" charset="0"/>
-              </a:rPr>
-              <a:t>$ git fetch &lt;remote-name&gt;</a:t>
-            </a:r>
-            <a:r>
-              <a:rPr lang="ru-RU" altLang="en-US" sz="4800">
-                <a:solidFill>
-                  <a:schemeClr val="tx1"/>
-                </a:solidFill>
-                <a:latin typeface="Arial Black" panose="020B0A04020102020204" pitchFamily="34" charset="0"/>
-                <a:cs typeface="Arial Black" panose="020B0A04020102020204" pitchFamily="34" charset="0"/>
-              </a:rPr>
-              <a:t> - б</a:t>
-            </a:r>
-            <a:r>
-              <a:rPr lang="ru-RU" altLang="en-US" sz="4800">
-                <a:solidFill>
-                  <a:schemeClr val="tx1"/>
-                </a:solidFill>
-                <a:latin typeface="Arial Black" panose="020B0A04020102020204" pitchFamily="34" charset="0"/>
-                <a:cs typeface="Arial Black" panose="020B0A04020102020204" pitchFamily="34" charset="0"/>
-                <a:sym typeface="+mn-ea"/>
-              </a:rPr>
-              <a:t>ез слияния;</a:t>
-            </a:r>
-            <a:endParaRPr lang="ru-RU" altLang="en-US" sz="4800">
-              <a:solidFill>
-                <a:schemeClr val="tx1"/>
-              </a:solidFill>
-              <a:latin typeface="Arial Black" panose="020B0A04020102020204" pitchFamily="34" charset="0"/>
-              <a:cs typeface="Arial Black" panose="020B0A04020102020204" pitchFamily="34" charset="0"/>
-            </a:endParaRPr>
-          </a:p>
-          <a:p>
-            <a:pPr marL="1143000" lvl="1" indent="-685800">
-              <a:lnSpc>
-                <a:spcPct val="100000"/>
-              </a:lnSpc>
-              <a:buFont typeface="Arial" panose="020B0604020202020204" pitchFamily="34" charset="0"/>
-              <a:buChar char="•"/>
-            </a:pPr>
-            <a:r>
-              <a:rPr lang="ru-RU" altLang="en-US" sz="4800" b="1">
-                <a:solidFill>
-                  <a:schemeClr val="tx1"/>
-                </a:solidFill>
-                <a:latin typeface="Consolas" panose="020B0609020204030204" charset="0"/>
-                <a:cs typeface="Consolas" panose="020B0609020204030204" charset="0"/>
-                <a:sym typeface="+mn-ea"/>
-              </a:rPr>
-              <a:t>$ git pull</a:t>
-            </a:r>
-            <a:r>
-              <a:rPr lang="ru-RU" altLang="en-US" sz="4800">
-                <a:solidFill>
-                  <a:schemeClr val="tx1"/>
-                </a:solidFill>
-                <a:latin typeface="Arial Black" panose="020B0A04020102020204" pitchFamily="34" charset="0"/>
-                <a:cs typeface="Arial Black" panose="020B0A04020102020204" pitchFamily="34" charset="0"/>
-                <a:sym typeface="+mn-ea"/>
-              </a:rPr>
-              <a:t> - с</a:t>
-            </a:r>
-            <a:r>
-              <a:rPr lang="ru-RU" altLang="en-US" sz="4800">
-                <a:solidFill>
-                  <a:schemeClr val="tx1"/>
-                </a:solidFill>
-                <a:latin typeface="Arial Black" panose="020B0A04020102020204" pitchFamily="34" charset="0"/>
-                <a:cs typeface="Arial Black" panose="020B0A04020102020204" pitchFamily="34" charset="0"/>
-              </a:rPr>
-              <a:t>о слиянием;</a:t>
-            </a:r>
-            <a:endParaRPr lang="ru-RU" altLang="en-US" sz="4800">
-              <a:solidFill>
-                <a:schemeClr val="tx1"/>
-              </a:solidFill>
-              <a:latin typeface="Arial Black" panose="020B0A04020102020204" pitchFamily="34" charset="0"/>
-              <a:cs typeface="Arial Black" panose="020B0A04020102020204" pitchFamily="34" charset="0"/>
-            </a:endParaRPr>
-          </a:p>
-          <a:p>
-            <a:pPr marL="685800" indent="-685800">
+            <a:pPr marL="685800" lvl="0" indent="-685800">
               <a:lnSpc>
                 <a:spcPct val="100000"/>
               </a:lnSpc>
@@ -17399,112 +17357,12 @@
             </a:endParaRPr>
           </a:p>
           <a:p>
-            <a:pPr marL="685800" indent="-685800">
+            <a:pPr marL="0" indent="0">
               <a:lnSpc>
                 <a:spcPct val="100000"/>
               </a:lnSpc>
               <a:buFont typeface="Arial" panose="020B0604020202020204" pitchFamily="34" charset="0"/>
-              <a:buChar char="•"/>
             </a:pPr>
-            <a:r>
-              <a:rPr lang="ru-RU" altLang="en-US" sz="4800" b="1">
-                <a:solidFill>
-                  <a:schemeClr val="tx1"/>
-                </a:solidFill>
-                <a:latin typeface="Consolas" panose="020B0609020204030204" charset="0"/>
-                <a:cs typeface="Consolas" panose="020B0609020204030204" charset="0"/>
-                <a:sym typeface="+mn-ea"/>
-              </a:rPr>
-              <a:t>$ git push &lt;remote-name&gt; &lt;branch-name&gt;</a:t>
-            </a:r>
-            <a:r>
-              <a:rPr lang="ru-RU" altLang="en-US" sz="4800">
-                <a:solidFill>
-                  <a:schemeClr val="tx1"/>
-                </a:solidFill>
-                <a:latin typeface="Arial Black" panose="020B0A04020102020204" pitchFamily="34" charset="0"/>
-                <a:cs typeface="Arial Black" panose="020B0A04020102020204" pitchFamily="34" charset="0"/>
-                <a:sym typeface="+mn-ea"/>
-              </a:rPr>
-              <a:t> - </a:t>
-            </a:r>
-            <a:r>
-              <a:rPr lang="ru-RU" altLang="en-US" sz="4800">
-                <a:solidFill>
-                  <a:schemeClr val="tx1"/>
-                </a:solidFill>
-                <a:latin typeface="Arial Black" panose="020B0A04020102020204" pitchFamily="34" charset="0"/>
-                <a:cs typeface="Arial Black" panose="020B0A04020102020204" pitchFamily="34" charset="0"/>
-              </a:rPr>
-              <a:t>отправка изменений;</a:t>
-            </a:r>
-            <a:endParaRPr lang="ru-RU" altLang="en-US" sz="4800">
-              <a:solidFill>
-                <a:schemeClr val="tx1"/>
-              </a:solidFill>
-              <a:latin typeface="Arial Black" panose="020B0A04020102020204" pitchFamily="34" charset="0"/>
-              <a:cs typeface="Arial Black" panose="020B0A04020102020204" pitchFamily="34" charset="0"/>
-            </a:endParaRPr>
-          </a:p>
-          <a:p>
-            <a:pPr marL="685800" indent="-685800">
-              <a:lnSpc>
-                <a:spcPct val="100000"/>
-              </a:lnSpc>
-              <a:buFont typeface="Arial" panose="020B0604020202020204" pitchFamily="34" charset="0"/>
-              <a:buChar char="•"/>
-            </a:pPr>
-            <a:r>
-              <a:rPr lang="ru-RU" altLang="en-US" sz="4800" b="1">
-                <a:solidFill>
-                  <a:schemeClr val="tx1"/>
-                </a:solidFill>
-                <a:latin typeface="Consolas" panose="020B0609020204030204" charset="0"/>
-                <a:cs typeface="Consolas" panose="020B0609020204030204" charset="0"/>
-              </a:rPr>
-              <a:t>$ git remote remove &lt;</a:t>
-            </a:r>
-            <a:r>
-              <a:rPr lang="en-US" altLang="ru-RU" sz="4800" b="1">
-                <a:solidFill>
-                  <a:schemeClr val="tx1"/>
-                </a:solidFill>
-                <a:latin typeface="Consolas" panose="020B0609020204030204" charset="0"/>
-                <a:cs typeface="Consolas" panose="020B0609020204030204" charset="0"/>
-              </a:rPr>
-              <a:t>repo_</a:t>
-            </a:r>
-            <a:r>
-              <a:rPr lang="ru-RU" altLang="en-US" sz="4800" b="1">
-                <a:solidFill>
-                  <a:schemeClr val="tx1"/>
-                </a:solidFill>
-                <a:latin typeface="Consolas" panose="020B0609020204030204" charset="0"/>
-                <a:cs typeface="Consolas" panose="020B0609020204030204" charset="0"/>
-              </a:rPr>
-              <a:t>name&gt;</a:t>
-            </a:r>
-            <a:r>
-              <a:rPr lang="ru-RU" altLang="en-US" sz="4800">
-                <a:solidFill>
-                  <a:schemeClr val="tx1"/>
-                </a:solidFill>
-                <a:latin typeface="Arial Black" panose="020B0A04020102020204" pitchFamily="34" charset="0"/>
-                <a:cs typeface="Arial Black" panose="020B0A04020102020204" pitchFamily="34" charset="0"/>
-              </a:rPr>
-              <a:t> - у</a:t>
-            </a:r>
-            <a:r>
-              <a:rPr lang="ru-RU" altLang="en-US" sz="4800">
-                <a:solidFill>
-                  <a:schemeClr val="tx1"/>
-                </a:solidFill>
-                <a:latin typeface="Arial Black" panose="020B0A04020102020204" pitchFamily="34" charset="0"/>
-                <a:cs typeface="Arial Black" panose="020B0A04020102020204" pitchFamily="34" charset="0"/>
-                <a:sym typeface="+mn-ea"/>
-              </a:rPr>
-              <a:t>даление: </a:t>
-            </a:r>
             <a:endParaRPr lang="ru-RU" altLang="en-US" sz="4800">
               <a:solidFill>
                 <a:schemeClr val="tx1"/>
@@ -17539,6 +17397,591 @@
 </file>
 
 <file path=ppt/slides/slide22.xml><?xml version="1.0" encoding="utf-8"?>
+<p:sld xmlns:a="http://schemas.openxmlformats.org/drawingml/2006/main" xmlns:r="http://schemas.openxmlformats.org/officeDocument/2006/relationships" xmlns:p="http://schemas.openxmlformats.org/presentationml/2006/main">
+  <p:cSld>
+    <p:spTree>
+      <p:nvGrpSpPr>
+        <p:cNvPr id="1" name=""/>
+        <p:cNvGrpSpPr/>
+        <p:nvPr/>
+      </p:nvGrpSpPr>
+      <p:grpSpPr>
+        <a:xfrm>
+          <a:off x="0" y="0"/>
+          <a:ext cx="0" cy="0"/>
+          <a:chOff x="0" y="0"/>
+          <a:chExt cx="0" cy="0"/>
+        </a:xfrm>
+      </p:grpSpPr>
+      <p:sp>
+        <p:nvSpPr>
+          <p:cNvPr id="2" name="Заголовок 1"/>
+          <p:cNvSpPr>
+            <a:spLocks noGrp="1"/>
+          </p:cNvSpPr>
+          <p:nvPr>
+            <p:ph type="title"/>
+          </p:nvPr>
+        </p:nvSpPr>
+        <p:spPr>
+          <a:xfrm>
+            <a:off x="880110" y="557530"/>
+            <a:ext cx="15902940" cy="1755140"/>
+          </a:xfrm>
+        </p:spPr>
+        <p:txBody>
+          <a:bodyPr/>
+          <a:lstStyle/>
+          <a:p>
+            <a:r>
+              <a:rPr lang="ru-RU" altLang="ru-RU" dirty="0"/>
+              <a:t>Удаленные репозитории</a:t>
+            </a:r>
+            <a:endParaRPr lang="ru-RU" altLang="ru-RU" dirty="0"/>
+          </a:p>
+        </p:txBody>
+      </p:sp>
+      <p:sp>
+        <p:nvSpPr>
+          <p:cNvPr id="4" name="Номер слайда 3"/>
+          <p:cNvSpPr>
+            <a:spLocks noGrp="1"/>
+          </p:cNvSpPr>
+          <p:nvPr>
+            <p:ph type="sldNum" idx="12"/>
+          </p:nvPr>
+        </p:nvSpPr>
+        <p:spPr/>
+        <p:txBody>
+          <a:bodyPr/>
+          <a:lstStyle/>
+          <a:p>
+            <a:fld id="{00000000-1234-1234-1234-123412341234}" type="slidenum">
+              <a:rPr lang="ru-RU" smtClean="0"/>
+            </a:fld>
+            <a:endParaRPr lang="ru-RU" dirty="0"/>
+          </a:p>
+        </p:txBody>
+      </p:sp>
+      <p:sp>
+        <p:nvSpPr>
+          <p:cNvPr id="3" name="Текстовое поле 2"/>
+          <p:cNvSpPr txBox="1"/>
+          <p:nvPr/>
+        </p:nvSpPr>
+        <p:spPr>
+          <a:xfrm>
+            <a:off x="1214120" y="2825750"/>
+            <a:ext cx="21869400" cy="9610725"/>
+          </a:xfrm>
+          <a:prstGeom prst="rect">
+            <a:avLst/>
+          </a:prstGeom>
+          <a:noFill/>
+        </p:spPr>
+        <p:txBody>
+          <a:bodyPr wrap="square" rtlCol="0" anchor="t">
+            <a:noAutofit/>
+          </a:bodyPr>
+          <a:p>
+            <a:pPr marL="685800" indent="-685800">
+              <a:lnSpc>
+                <a:spcPct val="100000"/>
+              </a:lnSpc>
+              <a:buFont typeface="Arial" panose="020B0604020202020204" pitchFamily="34" charset="0"/>
+              <a:buChar char="•"/>
+            </a:pPr>
+            <a:r>
+              <a:rPr lang="ru-RU" altLang="en-US" sz="4800">
+                <a:solidFill>
+                  <a:schemeClr val="tx1"/>
+                </a:solidFill>
+                <a:latin typeface="Arial Black" panose="020B0A04020102020204" pitchFamily="34" charset="0"/>
+                <a:cs typeface="Arial Black" panose="020B0A04020102020204" pitchFamily="34" charset="0"/>
+              </a:rPr>
+              <a:t>Просмотр удаленных репозиториев: </a:t>
+            </a:r>
+            <a:endParaRPr lang="ru-RU" altLang="en-US" sz="4800">
+              <a:solidFill>
+                <a:schemeClr val="tx1"/>
+              </a:solidFill>
+              <a:latin typeface="Arial Black" panose="020B0A04020102020204" pitchFamily="34" charset="0"/>
+              <a:cs typeface="Arial Black" panose="020B0A04020102020204" pitchFamily="34" charset="0"/>
+            </a:endParaRPr>
+          </a:p>
+          <a:p>
+            <a:pPr marL="1143000" lvl="1" indent="-685800">
+              <a:lnSpc>
+                <a:spcPct val="100000"/>
+              </a:lnSpc>
+              <a:buFont typeface="Arial" panose="020B0604020202020204" pitchFamily="34" charset="0"/>
+              <a:buChar char="•"/>
+            </a:pPr>
+            <a:r>
+              <a:rPr lang="ru-RU" altLang="en-US" sz="4800" b="1">
+                <a:solidFill>
+                  <a:schemeClr val="tx1"/>
+                </a:solidFill>
+                <a:latin typeface="Consolas" panose="020B0609020204030204" charset="0"/>
+                <a:cs typeface="Consolas" panose="020B0609020204030204" charset="0"/>
+                <a:sym typeface="+mn-ea"/>
+              </a:rPr>
+              <a:t>$ git remote</a:t>
+            </a:r>
+            <a:r>
+              <a:rPr lang="ru-RU" altLang="en-US" sz="4800">
+                <a:solidFill>
+                  <a:schemeClr val="tx1"/>
+                </a:solidFill>
+                <a:latin typeface="Arial Black" panose="020B0A04020102020204" pitchFamily="34" charset="0"/>
+                <a:cs typeface="Arial Black" panose="020B0A04020102020204" pitchFamily="34" charset="0"/>
+                <a:sym typeface="+mn-ea"/>
+              </a:rPr>
+              <a:t> - </a:t>
+            </a:r>
+            <a:r>
+              <a:rPr lang="ru-RU" altLang="en-US" sz="4800">
+                <a:solidFill>
+                  <a:schemeClr val="tx1"/>
+                </a:solidFill>
+                <a:latin typeface="Arial Black" panose="020B0A04020102020204" pitchFamily="34" charset="0"/>
+                <a:cs typeface="Arial Black" panose="020B0A04020102020204" pitchFamily="34" charset="0"/>
+              </a:rPr>
+              <a:t>без подробностей;</a:t>
+            </a:r>
+            <a:endParaRPr lang="ru-RU" altLang="en-US" sz="4800">
+              <a:solidFill>
+                <a:schemeClr val="tx1"/>
+              </a:solidFill>
+              <a:latin typeface="Arial Black" panose="020B0A04020102020204" pitchFamily="34" charset="0"/>
+              <a:cs typeface="Arial Black" panose="020B0A04020102020204" pitchFamily="34" charset="0"/>
+            </a:endParaRPr>
+          </a:p>
+          <a:p>
+            <a:pPr marL="1143000" lvl="1" indent="-685800">
+              <a:lnSpc>
+                <a:spcPct val="100000"/>
+              </a:lnSpc>
+              <a:buFont typeface="Arial" panose="020B0604020202020204" pitchFamily="34" charset="0"/>
+              <a:buChar char="•"/>
+            </a:pPr>
+            <a:r>
+              <a:rPr lang="ru-RU" altLang="en-US" sz="4800" b="1">
+                <a:solidFill>
+                  <a:schemeClr val="tx1"/>
+                </a:solidFill>
+                <a:latin typeface="Consolas" panose="020B0609020204030204" charset="0"/>
+                <a:cs typeface="Consolas" panose="020B0609020204030204" charset="0"/>
+                <a:sym typeface="+mn-ea"/>
+              </a:rPr>
+              <a:t>$ git remote -v</a:t>
+            </a:r>
+            <a:r>
+              <a:rPr lang="ru-RU" altLang="en-US" sz="4800">
+                <a:solidFill>
+                  <a:schemeClr val="tx1"/>
+                </a:solidFill>
+                <a:latin typeface="Arial Black" panose="020B0A04020102020204" pitchFamily="34" charset="0"/>
+                <a:cs typeface="Arial Black" panose="020B0A04020102020204" pitchFamily="34" charset="0"/>
+                <a:sym typeface="+mn-ea"/>
+              </a:rPr>
+              <a:t> - </a:t>
+            </a:r>
+            <a:r>
+              <a:rPr lang="ru-RU" altLang="en-US" sz="4800">
+                <a:solidFill>
+                  <a:schemeClr val="tx1"/>
+                </a:solidFill>
+                <a:latin typeface="Arial Black" panose="020B0A04020102020204" pitchFamily="34" charset="0"/>
+                <a:cs typeface="Arial Black" panose="020B0A04020102020204" pitchFamily="34" charset="0"/>
+              </a:rPr>
+              <a:t>с подробностями;</a:t>
+            </a:r>
+            <a:endParaRPr lang="ru-RU" altLang="en-US" sz="4800">
+              <a:solidFill>
+                <a:schemeClr val="tx1"/>
+              </a:solidFill>
+              <a:latin typeface="Arial Black" panose="020B0A04020102020204" pitchFamily="34" charset="0"/>
+              <a:cs typeface="Arial Black" panose="020B0A04020102020204" pitchFamily="34" charset="0"/>
+            </a:endParaRPr>
+          </a:p>
+          <a:p>
+            <a:pPr marL="1143000" lvl="1" indent="-685800">
+              <a:lnSpc>
+                <a:spcPct val="100000"/>
+              </a:lnSpc>
+              <a:buFont typeface="Arial" panose="020B0604020202020204" pitchFamily="34" charset="0"/>
+              <a:buChar char="•"/>
+            </a:pPr>
+            <a:endParaRPr lang="ru-RU" altLang="en-US" sz="4800">
+              <a:solidFill>
+                <a:schemeClr val="tx1"/>
+              </a:solidFill>
+              <a:latin typeface="Arial Black" panose="020B0A04020102020204" pitchFamily="34" charset="0"/>
+              <a:cs typeface="Arial Black" panose="020B0A04020102020204" pitchFamily="34" charset="0"/>
+            </a:endParaRPr>
+          </a:p>
+          <a:p>
+            <a:pPr marL="685800" indent="-685800">
+              <a:lnSpc>
+                <a:spcPct val="100000"/>
+              </a:lnSpc>
+              <a:buFont typeface="Arial" panose="020B0604020202020204" pitchFamily="34" charset="0"/>
+              <a:buChar char="•"/>
+            </a:pPr>
+            <a:r>
+              <a:rPr lang="ru-RU" altLang="en-US" sz="4800" b="1">
+                <a:solidFill>
+                  <a:schemeClr val="tx1"/>
+                </a:solidFill>
+                <a:latin typeface="Consolas" panose="020B0609020204030204" charset="0"/>
+                <a:cs typeface="Consolas" panose="020B0609020204030204" charset="0"/>
+              </a:rPr>
+              <a:t>$ git remote add &lt;</a:t>
+            </a:r>
+            <a:r>
+              <a:rPr lang="en-US" altLang="ru-RU" sz="4800" b="1">
+                <a:solidFill>
+                  <a:schemeClr val="tx1"/>
+                </a:solidFill>
+                <a:latin typeface="Consolas" panose="020B0609020204030204" charset="0"/>
+                <a:cs typeface="Consolas" panose="020B0609020204030204" charset="0"/>
+              </a:rPr>
+              <a:t>repo_</a:t>
+            </a:r>
+            <a:r>
+              <a:rPr lang="ru-RU" altLang="en-US" sz="4800" b="1">
+                <a:solidFill>
+                  <a:schemeClr val="tx1"/>
+                </a:solidFill>
+                <a:latin typeface="Consolas" panose="020B0609020204030204" charset="0"/>
+                <a:cs typeface="Consolas" panose="020B0609020204030204" charset="0"/>
+              </a:rPr>
+              <a:t>name&gt; &lt;url&gt;</a:t>
+            </a:r>
+            <a:r>
+              <a:rPr lang="ru-RU" altLang="en-US" sz="4800">
+                <a:solidFill>
+                  <a:schemeClr val="tx1"/>
+                </a:solidFill>
+                <a:latin typeface="Arial Black" panose="020B0A04020102020204" pitchFamily="34" charset="0"/>
+                <a:cs typeface="Arial Black" panose="020B0A04020102020204" pitchFamily="34" charset="0"/>
+              </a:rPr>
+              <a:t> - д</a:t>
+            </a:r>
+            <a:r>
+              <a:rPr lang="ru-RU" altLang="en-US" sz="4800">
+                <a:solidFill>
+                  <a:schemeClr val="tx1"/>
+                </a:solidFill>
+                <a:latin typeface="Arial Black" panose="020B0A04020102020204" pitchFamily="34" charset="0"/>
+                <a:cs typeface="Arial Black" panose="020B0A04020102020204" pitchFamily="34" charset="0"/>
+                <a:sym typeface="+mn-ea"/>
+              </a:rPr>
+              <a:t>обавление репозиториев;</a:t>
+            </a:r>
+            <a:endParaRPr lang="ru-RU" altLang="en-US" sz="4800">
+              <a:solidFill>
+                <a:schemeClr val="tx1"/>
+              </a:solidFill>
+              <a:latin typeface="Arial Black" panose="020B0A04020102020204" pitchFamily="34" charset="0"/>
+              <a:cs typeface="Arial Black" panose="020B0A04020102020204" pitchFamily="34" charset="0"/>
+            </a:endParaRPr>
+          </a:p>
+          <a:p>
+            <a:pPr marL="685800" indent="-685800">
+              <a:lnSpc>
+                <a:spcPct val="100000"/>
+              </a:lnSpc>
+              <a:buFont typeface="Arial" panose="020B0604020202020204" pitchFamily="34" charset="0"/>
+              <a:buChar char="•"/>
+            </a:pPr>
+            <a:endParaRPr lang="ru-RU" altLang="en-US" sz="4800">
+              <a:solidFill>
+                <a:schemeClr val="tx1"/>
+              </a:solidFill>
+              <a:latin typeface="Arial Black" panose="020B0A04020102020204" pitchFamily="34" charset="0"/>
+              <a:cs typeface="Arial Black" panose="020B0A04020102020204" pitchFamily="34" charset="0"/>
+            </a:endParaRPr>
+          </a:p>
+          <a:p>
+            <a:pPr marL="685800" indent="-685800">
+              <a:lnSpc>
+                <a:spcPct val="100000"/>
+              </a:lnSpc>
+              <a:buFont typeface="Arial" panose="020B0604020202020204" pitchFamily="34" charset="0"/>
+              <a:buChar char="•"/>
+            </a:pPr>
+            <a:r>
+              <a:rPr lang="ru-RU" altLang="en-US" sz="4800">
+                <a:solidFill>
+                  <a:schemeClr val="tx1"/>
+                </a:solidFill>
+                <a:latin typeface="Arial Black" panose="020B0A04020102020204" pitchFamily="34" charset="0"/>
+                <a:cs typeface="Arial Black" panose="020B0A04020102020204" pitchFamily="34" charset="0"/>
+              </a:rPr>
+              <a:t>Получение изменений:</a:t>
+            </a:r>
+            <a:endParaRPr lang="ru-RU" altLang="en-US" sz="4800">
+              <a:solidFill>
+                <a:schemeClr val="tx1"/>
+              </a:solidFill>
+              <a:latin typeface="Arial Black" panose="020B0A04020102020204" pitchFamily="34" charset="0"/>
+              <a:cs typeface="Arial Black" panose="020B0A04020102020204" pitchFamily="34" charset="0"/>
+            </a:endParaRPr>
+          </a:p>
+          <a:p>
+            <a:pPr marL="1143000" lvl="1" indent="-685800">
+              <a:lnSpc>
+                <a:spcPct val="100000"/>
+              </a:lnSpc>
+              <a:buFont typeface="Arial" panose="020B0604020202020204" pitchFamily="34" charset="0"/>
+              <a:buChar char="•"/>
+            </a:pPr>
+            <a:r>
+              <a:rPr lang="ru-RU" altLang="en-US" sz="4800" b="1">
+                <a:solidFill>
+                  <a:schemeClr val="tx1"/>
+                </a:solidFill>
+                <a:latin typeface="Consolas" panose="020B0609020204030204" charset="0"/>
+                <a:cs typeface="Consolas" panose="020B0609020204030204" charset="0"/>
+              </a:rPr>
+              <a:t>$ git fetch &lt;remote-name&gt;</a:t>
+            </a:r>
+            <a:r>
+              <a:rPr lang="ru-RU" altLang="en-US" sz="4800">
+                <a:solidFill>
+                  <a:schemeClr val="tx1"/>
+                </a:solidFill>
+                <a:latin typeface="Arial Black" panose="020B0A04020102020204" pitchFamily="34" charset="0"/>
+                <a:cs typeface="Arial Black" panose="020B0A04020102020204" pitchFamily="34" charset="0"/>
+              </a:rPr>
+              <a:t> - б</a:t>
+            </a:r>
+            <a:r>
+              <a:rPr lang="ru-RU" altLang="en-US" sz="4800">
+                <a:solidFill>
+                  <a:schemeClr val="tx1"/>
+                </a:solidFill>
+                <a:latin typeface="Arial Black" panose="020B0A04020102020204" pitchFamily="34" charset="0"/>
+                <a:cs typeface="Arial Black" panose="020B0A04020102020204" pitchFamily="34" charset="0"/>
+                <a:sym typeface="+mn-ea"/>
+              </a:rPr>
+              <a:t>ез слияния;</a:t>
+            </a:r>
+            <a:endParaRPr lang="ru-RU" altLang="en-US" sz="4800">
+              <a:solidFill>
+                <a:schemeClr val="tx1"/>
+              </a:solidFill>
+              <a:latin typeface="Arial Black" panose="020B0A04020102020204" pitchFamily="34" charset="0"/>
+              <a:cs typeface="Arial Black" panose="020B0A04020102020204" pitchFamily="34" charset="0"/>
+            </a:endParaRPr>
+          </a:p>
+          <a:p>
+            <a:pPr marL="1143000" lvl="1" indent="-685800">
+              <a:lnSpc>
+                <a:spcPct val="100000"/>
+              </a:lnSpc>
+              <a:buFont typeface="Arial" panose="020B0604020202020204" pitchFamily="34" charset="0"/>
+              <a:buChar char="•"/>
+            </a:pPr>
+            <a:r>
+              <a:rPr lang="ru-RU" altLang="en-US" sz="4800" b="1">
+                <a:solidFill>
+                  <a:schemeClr val="tx1"/>
+                </a:solidFill>
+                <a:latin typeface="Consolas" panose="020B0609020204030204" charset="0"/>
+                <a:cs typeface="Consolas" panose="020B0609020204030204" charset="0"/>
+                <a:sym typeface="+mn-ea"/>
+              </a:rPr>
+              <a:t>$ git pull</a:t>
+            </a:r>
+            <a:r>
+              <a:rPr lang="ru-RU" altLang="en-US" sz="4800">
+                <a:solidFill>
+                  <a:schemeClr val="tx1"/>
+                </a:solidFill>
+                <a:latin typeface="Arial Black" panose="020B0A04020102020204" pitchFamily="34" charset="0"/>
+                <a:cs typeface="Arial Black" panose="020B0A04020102020204" pitchFamily="34" charset="0"/>
+                <a:sym typeface="+mn-ea"/>
+              </a:rPr>
+              <a:t> - с</a:t>
+            </a:r>
+            <a:r>
+              <a:rPr lang="ru-RU" altLang="en-US" sz="4800">
+                <a:solidFill>
+                  <a:schemeClr val="tx1"/>
+                </a:solidFill>
+                <a:latin typeface="Arial Black" panose="020B0A04020102020204" pitchFamily="34" charset="0"/>
+                <a:cs typeface="Arial Black" panose="020B0A04020102020204" pitchFamily="34" charset="0"/>
+              </a:rPr>
+              <a:t>о слиянием;</a:t>
+            </a:r>
+            <a:endParaRPr lang="ru-RU" altLang="en-US" sz="4800">
+              <a:solidFill>
+                <a:schemeClr val="tx1"/>
+              </a:solidFill>
+              <a:latin typeface="Arial Black" panose="020B0A04020102020204" pitchFamily="34" charset="0"/>
+              <a:cs typeface="Arial Black" panose="020B0A04020102020204" pitchFamily="34" charset="0"/>
+            </a:endParaRPr>
+          </a:p>
+          <a:p>
+            <a:pPr marL="685800" indent="-685800">
+              <a:lnSpc>
+                <a:spcPct val="100000"/>
+              </a:lnSpc>
+              <a:buFont typeface="Arial" panose="020B0604020202020204" pitchFamily="34" charset="0"/>
+              <a:buChar char="•"/>
+            </a:pPr>
+            <a:endParaRPr lang="ru-RU" altLang="en-US" sz="4800">
+              <a:solidFill>
+                <a:schemeClr val="tx1"/>
+              </a:solidFill>
+              <a:latin typeface="Arial Black" panose="020B0A04020102020204" pitchFamily="34" charset="0"/>
+              <a:cs typeface="Arial Black" panose="020B0A04020102020204" pitchFamily="34" charset="0"/>
+            </a:endParaRPr>
+          </a:p>
+          <a:p>
+            <a:pPr marL="685800" indent="-685800">
+              <a:lnSpc>
+                <a:spcPct val="100000"/>
+              </a:lnSpc>
+              <a:buFont typeface="Arial" panose="020B0604020202020204" pitchFamily="34" charset="0"/>
+              <a:buChar char="•"/>
+            </a:pPr>
+            <a:r>
+              <a:rPr lang="ru-RU" altLang="en-US" sz="4800" b="1">
+                <a:solidFill>
+                  <a:schemeClr val="tx1"/>
+                </a:solidFill>
+                <a:latin typeface="Consolas" panose="020B0609020204030204" charset="0"/>
+                <a:cs typeface="Consolas" panose="020B0609020204030204" charset="0"/>
+                <a:sym typeface="+mn-ea"/>
+              </a:rPr>
+              <a:t>$ git push &lt;remote-name&gt; &lt;branch-name&gt;</a:t>
+            </a:r>
+            <a:r>
+              <a:rPr lang="ru-RU" altLang="en-US" sz="4800">
+                <a:solidFill>
+                  <a:schemeClr val="tx1"/>
+                </a:solidFill>
+                <a:latin typeface="Arial Black" panose="020B0A04020102020204" pitchFamily="34" charset="0"/>
+                <a:cs typeface="Arial Black" panose="020B0A04020102020204" pitchFamily="34" charset="0"/>
+                <a:sym typeface="+mn-ea"/>
+              </a:rPr>
+              <a:t> - </a:t>
+            </a:r>
+            <a:r>
+              <a:rPr lang="ru-RU" altLang="en-US" sz="4800">
+                <a:solidFill>
+                  <a:schemeClr val="tx1"/>
+                </a:solidFill>
+                <a:latin typeface="Arial Black" panose="020B0A04020102020204" pitchFamily="34" charset="0"/>
+                <a:cs typeface="Arial Black" panose="020B0A04020102020204" pitchFamily="34" charset="0"/>
+              </a:rPr>
+              <a:t>отправка изменений;</a:t>
+            </a:r>
+            <a:endParaRPr lang="ru-RU" altLang="en-US" sz="4800">
+              <a:solidFill>
+                <a:schemeClr val="tx1"/>
+              </a:solidFill>
+              <a:latin typeface="Arial Black" panose="020B0A04020102020204" pitchFamily="34" charset="0"/>
+              <a:cs typeface="Arial Black" panose="020B0A04020102020204" pitchFamily="34" charset="0"/>
+            </a:endParaRPr>
+          </a:p>
+          <a:p>
+            <a:pPr marL="685800" indent="-685800">
+              <a:lnSpc>
+                <a:spcPct val="100000"/>
+              </a:lnSpc>
+              <a:buFont typeface="Arial" panose="020B0604020202020204" pitchFamily="34" charset="0"/>
+              <a:buChar char="•"/>
+            </a:pPr>
+            <a:r>
+              <a:rPr lang="ru-RU" altLang="en-US" sz="4800" b="1">
+                <a:solidFill>
+                  <a:schemeClr val="tx1"/>
+                </a:solidFill>
+                <a:latin typeface="Consolas" panose="020B0609020204030204" charset="0"/>
+                <a:cs typeface="Consolas" panose="020B0609020204030204" charset="0"/>
+              </a:rPr>
+              <a:t>$ git remote remove &lt;</a:t>
+            </a:r>
+            <a:r>
+              <a:rPr lang="en-US" altLang="ru-RU" sz="4800" b="1">
+                <a:solidFill>
+                  <a:schemeClr val="tx1"/>
+                </a:solidFill>
+                <a:latin typeface="Consolas" panose="020B0609020204030204" charset="0"/>
+                <a:cs typeface="Consolas" panose="020B0609020204030204" charset="0"/>
+              </a:rPr>
+              <a:t>repo_</a:t>
+            </a:r>
+            <a:r>
+              <a:rPr lang="ru-RU" altLang="en-US" sz="4800" b="1">
+                <a:solidFill>
+                  <a:schemeClr val="tx1"/>
+                </a:solidFill>
+                <a:latin typeface="Consolas" panose="020B0609020204030204" charset="0"/>
+                <a:cs typeface="Consolas" panose="020B0609020204030204" charset="0"/>
+              </a:rPr>
+              <a:t>name&gt;</a:t>
+            </a:r>
+            <a:r>
+              <a:rPr lang="ru-RU" altLang="en-US" sz="4800">
+                <a:solidFill>
+                  <a:schemeClr val="tx1"/>
+                </a:solidFill>
+                <a:latin typeface="Arial Black" panose="020B0A04020102020204" pitchFamily="34" charset="0"/>
+                <a:cs typeface="Arial Black" panose="020B0A04020102020204" pitchFamily="34" charset="0"/>
+              </a:rPr>
+              <a:t> - у</a:t>
+            </a:r>
+            <a:r>
+              <a:rPr lang="ru-RU" altLang="en-US" sz="4800">
+                <a:solidFill>
+                  <a:schemeClr val="tx1"/>
+                </a:solidFill>
+                <a:latin typeface="Arial Black" panose="020B0A04020102020204" pitchFamily="34" charset="0"/>
+                <a:cs typeface="Arial Black" panose="020B0A04020102020204" pitchFamily="34" charset="0"/>
+                <a:sym typeface="+mn-ea"/>
+              </a:rPr>
+              <a:t>даление: </a:t>
+            </a:r>
+            <a:endParaRPr lang="ru-RU" altLang="en-US" sz="4800">
+              <a:solidFill>
+                <a:schemeClr val="tx1"/>
+              </a:solidFill>
+              <a:latin typeface="Arial Black" panose="020B0A04020102020204" pitchFamily="34" charset="0"/>
+              <a:cs typeface="Arial Black" panose="020B0A04020102020204" pitchFamily="34" charset="0"/>
+            </a:endParaRPr>
+          </a:p>
+        </p:txBody>
+      </p:sp>
+    </p:spTree>
+  </p:cSld>
+  <p:clrMapOvr>
+    <a:masterClrMapping/>
+  </p:clrMapOvr>
+  <mc:AlternateContent xmlns:mc="http://schemas.openxmlformats.org/markup-compatibility/2006">
+    <mc:Choice xmlns:p14="http://schemas.microsoft.com/office/powerpoint/2010/main" Requires="p14">
+      <p:transition p14:dur="0"/>
+    </mc:Choice>
+    <mc:Fallback>
+      <p:transition/>
+    </mc:Fallback>
+  </mc:AlternateContent>
+  <p:timing>
+    <p:tnLst>
+      <p:par>
+        <p:cTn id="1" dur="indefinite" restart="never" nodeType="tmRoot"/>
+      </p:par>
+    </p:tnLst>
+  </p:timing>
+</p:sld>
+</file>
+
+<file path=ppt/slides/slide23.xml><?xml version="1.0" encoding="utf-8"?>
 <p:sld xmlns:a="http://schemas.openxmlformats.org/drawingml/2006/main" xmlns:r="http://schemas.openxmlformats.org/officeDocument/2006/relationships" xmlns:p="http://schemas.openxmlformats.org/presentationml/2006/main">
   <p:cSld>
     <p:bg>

</xml_diff>

<commit_message>
Fix mistake on reset slide in intro-lesson1 presentation
</commit_message>
<xml_diff>
--- a/lessons/sem_00/lesson_01/git_intro.pptx
+++ b/lessons/sem_00/lesson_01/git_intro.pptx
@@ -17154,7 +17154,7 @@
                 <a:latin typeface="Consolas" panose="020B0609020204030204" charset="0"/>
                 <a:cs typeface="Consolas" panose="020B0609020204030204" charset="0"/>
               </a:rPr>
-              <a:t>$ git remote --soft &lt;hash&gt;</a:t>
+              <a:t>$ git reset --soft &lt;hash&gt;</a:t>
             </a:r>
             <a:r>
               <a:rPr lang="en-US" altLang="en-US" sz="4800">
@@ -17236,7 +17236,7 @@
                 <a:latin typeface="Consolas" panose="020B0609020204030204" charset="0"/>
                 <a:cs typeface="Consolas" panose="020B0609020204030204" charset="0"/>
               </a:rPr>
-              <a:t>$ git remote --mixed &lt;hash&gt;</a:t>
+              <a:t>$ git reset --mixed &lt;hash&gt;</a:t>
             </a:r>
             <a:r>
               <a:rPr lang="ru-RU" altLang="en-US" sz="4800">
@@ -17288,7 +17288,7 @@
                 <a:latin typeface="Consolas" panose="020B0609020204030204" charset="0"/>
                 <a:cs typeface="Consolas" panose="020B0609020204030204" charset="0"/>
               </a:rPr>
-              <a:t>$ git remote --hard &lt;hash&gt;</a:t>
+              <a:t>$ git reset --hard &lt;hash&gt;</a:t>
             </a:r>
             <a:r>
               <a:rPr lang="ru-RU" altLang="en-US" sz="4800">

</xml_diff>